<commit_message>
Metadata for PPT/PDF updated
</commit_message>
<xml_diff>
--- a/2019/2019.03.12-AWS-pangyo/aws-cfn-stackset.pptx
+++ b/2019/2019.03.12-AWS-pangyo/aws-cfn-stackset.pptx
@@ -987,7 +987,7 @@
                 <a:tabLst/>
                 <a:defRPr/>
               </a:pPr>
-              <a:t>3/13/2019 11:25 AM</a:t>
+              <a:t>3/14/2019 10:02 AM</a:t>
             </a:fld>
             <a:endParaRPr kumimoji="0" lang="en-US" sz="1200" b="0" i="0" u="none" strike="noStrike" kern="1200" cap="none" spc="0" normalizeH="0" baseline="0" noProof="0">
               <a:ln>
@@ -2385,7 +2385,7 @@
                 <a:tabLst/>
                 <a:defRPr/>
               </a:pPr>
-              <a:t>3/13/2019 11:25 AM</a:t>
+              <a:t>3/14/2019 10:02 AM</a:t>
             </a:fld>
             <a:endParaRPr kumimoji="0" lang="en-US" sz="1200" b="0" i="0" u="none" strike="noStrike" kern="1200" cap="none" spc="0" normalizeH="0" baseline="0" noProof="0">
               <a:ln>

</xml_diff>